<commit_message>
Updated for S1P 2018
</commit_message>
<xml_diff>
--- a/instructions/Idea 2 Prod - S1P DotNet Demo.pptx
+++ b/instructions/Idea 2 Prod - S1P DotNet Demo.pptx
@@ -5,7 +5,7 @@
     <p:sldMasterId id="2147483651" r:id="rId1"/>
   </p:sldMasterIdLst>
   <p:notesMasterIdLst>
-    <p:notesMasterId r:id="rId22"/>
+    <p:notesMasterId r:id="rId23"/>
   </p:notesMasterIdLst>
   <p:sldIdLst>
     <p:sldId id="256" r:id="rId2"/>
@@ -27,7 +27,8 @@
     <p:sldId id="337" r:id="rId18"/>
     <p:sldId id="335" r:id="rId19"/>
     <p:sldId id="336" r:id="rId20"/>
-    <p:sldId id="339" r:id="rId21"/>
+    <p:sldId id="340" r:id="rId21"/>
+    <p:sldId id="339" r:id="rId22"/>
   </p:sldIdLst>
   <p:sldSz cx="9144000" cy="5143500" type="screen16x9"/>
   <p:notesSz cx="6858000" cy="9144000"/>
@@ -252,10 +253,6 @@
 </p:presentation>
 </file>
 
-<file path=ppt/revisionInfo.xml><?xml version="1.0" encoding="utf-8"?>
-<p1510:revInfo xmlns:a="http://schemas.openxmlformats.org/drawingml/2006/main" xmlns:r="http://schemas.openxmlformats.org/officeDocument/2006/relationships" xmlns:p1510="http://schemas.microsoft.com/office/powerpoint/2015/10/main"/>
-</file>
-
 <file path=ppt/notesMasters/notesMaster1.xml><?xml version="1.0" encoding="utf-8"?>
 <p:notesMaster xmlns:a="http://schemas.openxmlformats.org/drawingml/2006/main" xmlns:r="http://schemas.openxmlformats.org/officeDocument/2006/relationships" xmlns:p="http://schemas.openxmlformats.org/presentationml/2006/main">
   <p:cSld>
@@ -1571,6 +1568,116 @@
 </file>
 
 <file path=ppt/notesSlides/notesSlide12.xml><?xml version="1.0" encoding="utf-8"?>
+<p:notes xmlns:a="http://schemas.openxmlformats.org/drawingml/2006/main" xmlns:r="http://schemas.openxmlformats.org/officeDocument/2006/relationships" xmlns:p="http://schemas.openxmlformats.org/presentationml/2006/main">
+  <p:cSld>
+    <p:spTree>
+      <p:nvGrpSpPr>
+        <p:cNvPr id="1" name=""/>
+        <p:cNvGrpSpPr/>
+        <p:nvPr/>
+      </p:nvGrpSpPr>
+      <p:grpSpPr>
+        <a:xfrm>
+          <a:off x="0" y="0"/>
+          <a:ext cx="0" cy="0"/>
+          <a:chOff x="0" y="0"/>
+          <a:chExt cx="0" cy="0"/>
+        </a:xfrm>
+      </p:grpSpPr>
+      <p:sp>
+        <p:nvSpPr>
+          <p:cNvPr id="2" name="Slide Image Placeholder 1"/>
+          <p:cNvSpPr>
+            <a:spLocks noGrp="1" noRot="1" noChangeAspect="1"/>
+          </p:cNvSpPr>
+          <p:nvPr>
+            <p:ph type="sldImg"/>
+          </p:nvPr>
+        </p:nvSpPr>
+        <p:spPr/>
+      </p:sp>
+      <p:sp>
+        <p:nvSpPr>
+          <p:cNvPr id="3" name="Notes Placeholder 2"/>
+          <p:cNvSpPr>
+            <a:spLocks noGrp="1"/>
+          </p:cNvSpPr>
+          <p:nvPr>
+            <p:ph type="body" idx="1"/>
+          </p:nvPr>
+        </p:nvSpPr>
+        <p:spPr/>
+        <p:txBody>
+          <a:bodyPr/>
+          <a:lstStyle/>
+          <a:p>
+            <a:r>
+              <a:rPr lang="en-US" dirty="0"/>
+              <a:t>PCF provides a robust set of metrics and data for .NET application developers</a:t>
+            </a:r>
+          </a:p>
+        </p:txBody>
+      </p:sp>
+      <p:sp>
+        <p:nvSpPr>
+          <p:cNvPr id="4" name="Slide Number Placeholder 3"/>
+          <p:cNvSpPr>
+            <a:spLocks noGrp="1"/>
+          </p:cNvSpPr>
+          <p:nvPr>
+            <p:ph type="sldNum" idx="10"/>
+          </p:nvPr>
+        </p:nvSpPr>
+        <p:spPr/>
+        <p:txBody>
+          <a:bodyPr/>
+          <a:lstStyle/>
+          <a:p>
+            <a:pPr marL="0" marR="0" lvl="0" indent="0" algn="r" rtl="0">
+              <a:spcBef>
+                <a:spcPts val="0"/>
+              </a:spcBef>
+              <a:buSzPct val="25000"/>
+              <a:buNone/>
+            </a:pPr>
+            <a:fld id="{00000000-1234-1234-1234-123412341234}" type="slidenum">
+              <a:rPr lang="en-US" sz="1200" b="0" i="0" u="none" strike="noStrike" cap="none" smtClean="0">
+                <a:solidFill>
+                  <a:schemeClr val="dk1"/>
+                </a:solidFill>
+                <a:latin typeface="Calibri"/>
+                <a:ea typeface="Calibri"/>
+                <a:cs typeface="Calibri"/>
+                <a:sym typeface="Calibri"/>
+              </a:rPr>
+              <a:t>20</a:t>
+            </a:fld>
+            <a:endParaRPr lang="en-US" sz="1200" b="0" i="0" u="none" strike="noStrike" cap="none">
+              <a:solidFill>
+                <a:schemeClr val="dk1"/>
+              </a:solidFill>
+              <a:latin typeface="Calibri"/>
+              <a:ea typeface="Calibri"/>
+              <a:cs typeface="Calibri"/>
+              <a:sym typeface="Calibri"/>
+            </a:endParaRPr>
+          </a:p>
+        </p:txBody>
+      </p:sp>
+    </p:spTree>
+    <p:extLst>
+      <p:ext uri="{BB962C8B-B14F-4D97-AF65-F5344CB8AC3E}">
+        <p14:creationId xmlns:p14="http://schemas.microsoft.com/office/powerpoint/2010/main" val="2122106684"/>
+      </p:ext>
+    </p:extLst>
+  </p:cSld>
+  <p:clrMapOvr>
+    <a:masterClrMapping/>
+  </p:clrMapOvr>
+</p:notes>
+</file>
+
+<file path=ppt/notesSlides/notesSlide13.xml><?xml version="1.0" encoding="utf-8"?>
 <p:notes xmlns:a="http://schemas.openxmlformats.org/drawingml/2006/main" xmlns:r="http://schemas.openxmlformats.org/officeDocument/2006/relationships" xmlns:p="http://schemas.openxmlformats.org/presentationml/2006/main" showMasterSp="0" showMasterPhAnim="0">
   <p:cSld>
     <p:spTree>
@@ -1724,7 +1831,7 @@
               </a:spcBef>
               <a:buNone/>
             </a:pPr>
-            <a:endParaRPr/>
+            <a:endParaRPr dirty="0"/>
           </a:p>
         </p:txBody>
       </p:sp>
@@ -2683,7 +2790,7 @@
                 <a:cs typeface="Calibri"/>
                 <a:sym typeface="Calibri"/>
               </a:rPr>
-              <a:t> –s windows2012R2</a:t>
+              <a:t> –s windows2016</a:t>
             </a:r>
           </a:p>
           <a:p>
@@ -2923,7 +3030,7 @@
               <a:t>appname</a:t>
             </a:r>
             <a:r>
-              <a:rPr lang="en-US" sz="1200" b="0" i="0" u="none" strike="noStrike" cap="none" baseline="0">
+              <a:rPr lang="en-US" sz="1200" b="0" i="0" u="none" strike="noStrike" cap="none" baseline="0" dirty="0">
                 <a:solidFill>
                   <a:schemeClr val="dk1"/>
                 </a:solidFill>
@@ -4452,38 +4559,8 @@
         </p:blipFill>
         <p:spPr>
           <a:xfrm>
-            <a:off x="390743" y="814140"/>
-            <a:ext cx="8289961" cy="3701475"/>
-          </a:xfrm>
-          <a:prstGeom prst="rect">
-            <a:avLst/>
-          </a:prstGeom>
-        </p:spPr>
-      </p:pic>
-      <p:pic>
-        <p:nvPicPr>
-          <p:cNvPr id="5" name="Picture 4">
-            <a:extLst>
-              <a:ext uri="{FF2B5EF4-FFF2-40B4-BE49-F238E27FC236}">
-                <a16:creationId xmlns:a16="http://schemas.microsoft.com/office/drawing/2014/main" id="{A0821851-880E-4FBF-ACD4-7E9273B8C6D5}"/>
-              </a:ext>
-            </a:extLst>
-          </p:cNvPr>
-          <p:cNvPicPr>
-            <a:picLocks noChangeAspect="1"/>
-          </p:cNvPicPr>
-          <p:nvPr/>
-        </p:nvPicPr>
-        <p:blipFill>
-          <a:blip r:embed="rId4"/>
-          <a:stretch>
-            <a:fillRect/>
-          </a:stretch>
-        </p:blipFill>
-        <p:spPr>
-          <a:xfrm>
-            <a:off x="1435417" y="1706879"/>
-            <a:ext cx="7245287" cy="3213163"/>
+            <a:off x="829852" y="1004706"/>
+            <a:ext cx="7484294" cy="3701475"/>
           </a:xfrm>
           <a:prstGeom prst="rect">
             <a:avLst/>
@@ -4543,6 +4620,41 @@
           </a:p>
         </p:txBody>
       </p:sp>
+      <p:pic>
+        <p:nvPicPr>
+          <p:cNvPr id="2" name="Picture 1">
+            <a:extLst>
+              <a:ext uri="{FF2B5EF4-FFF2-40B4-BE49-F238E27FC236}">
+                <a16:creationId xmlns:a16="http://schemas.microsoft.com/office/drawing/2014/main" id="{10931B5B-8BCA-4DDA-A9E6-2709CDBEDAEB}"/>
+              </a:ext>
+            </a:extLst>
+          </p:cNvPr>
+          <p:cNvPicPr>
+            <a:picLocks noChangeAspect="1"/>
+          </p:cNvPicPr>
+          <p:nvPr/>
+        </p:nvPicPr>
+        <p:blipFill>
+          <a:blip r:embed="rId4"/>
+          <a:stretch>
+            <a:fillRect/>
+          </a:stretch>
+        </p:blipFill>
+        <p:spPr>
+          <a:xfrm>
+            <a:off x="1698170" y="1918176"/>
+            <a:ext cx="5747657" cy="2925371"/>
+          </a:xfrm>
+          <a:prstGeom prst="rect">
+            <a:avLst/>
+          </a:prstGeom>
+          <a:ln>
+            <a:solidFill>
+              <a:schemeClr val="bg1"/>
+            </a:solidFill>
+          </a:ln>
+        </p:spPr>
+      </p:pic>
     </p:spTree>
     <p:extLst>
       <p:ext uri="{BB962C8B-B14F-4D97-AF65-F5344CB8AC3E}">
@@ -5985,7 +6097,7 @@
                 <a:cs typeface="Proxima Nova"/>
                 <a:sym typeface="Proxima Nova"/>
               </a:rPr>
-              <a:t>Demonstrate in 5 minutes how simple it can be to create a new.NET Core or .NET Framework application and then deploy on Pivotal Cloud Foundry </a:t>
+              <a:t>Demonstrate in less than 5 minutes how easy it can be to create a new .NET Core or .NET Framework application and then deploy on Pivotal Cloud Foundry and available on the internet</a:t>
             </a:r>
           </a:p>
         </p:txBody>
@@ -5999,6 +6111,276 @@
 </file>
 
 <file path=ppt/slides/slide20.xml><?xml version="1.0" encoding="utf-8"?>
+<p:sld xmlns:a="http://schemas.openxmlformats.org/drawingml/2006/main" xmlns:r="http://schemas.openxmlformats.org/officeDocument/2006/relationships" xmlns:p="http://schemas.openxmlformats.org/presentationml/2006/main">
+  <p:cSld>
+    <p:spTree>
+      <p:nvGrpSpPr>
+        <p:cNvPr id="1" name=""/>
+        <p:cNvGrpSpPr/>
+        <p:nvPr/>
+      </p:nvGrpSpPr>
+      <p:grpSpPr>
+        <a:xfrm>
+          <a:off x="0" y="0"/>
+          <a:ext cx="0" cy="0"/>
+          <a:chOff x="0" y="0"/>
+          <a:chExt cx="0" cy="0"/>
+        </a:xfrm>
+      </p:grpSpPr>
+      <p:sp>
+        <p:nvSpPr>
+          <p:cNvPr id="4" name="Shape 380">
+            <a:extLst>
+              <a:ext uri="{FF2B5EF4-FFF2-40B4-BE49-F238E27FC236}">
+                <a16:creationId xmlns:a16="http://schemas.microsoft.com/office/drawing/2014/main" id="{8A10849D-E539-43CE-B1FE-E8C701BC2B60}"/>
+              </a:ext>
+            </a:extLst>
+          </p:cNvPr>
+          <p:cNvSpPr txBox="1"/>
+          <p:nvPr/>
+        </p:nvSpPr>
+        <p:spPr>
+          <a:xfrm>
+            <a:off x="542260" y="207265"/>
+            <a:ext cx="8059478" cy="797441"/>
+          </a:xfrm>
+          <a:prstGeom prst="rect">
+            <a:avLst/>
+          </a:prstGeom>
+          <a:noFill/>
+          <a:ln>
+            <a:noFill/>
+          </a:ln>
+        </p:spPr>
+        <p:txBody>
+          <a:bodyPr lIns="91425" tIns="45700" rIns="91425" bIns="45700" anchor="t" anchorCtr="0">
+            <a:noAutofit/>
+          </a:bodyPr>
+          <a:lstStyle/>
+          <a:p>
+            <a:pPr marL="0" marR="0" lvl="0" indent="0" algn="l" rtl="0">
+              <a:spcBef>
+                <a:spcPts val="0"/>
+              </a:spcBef>
+              <a:buSzPct val="25000"/>
+              <a:buNone/>
+            </a:pPr>
+            <a:r>
+              <a:rPr lang="en-US" sz="3200" b="1" dirty="0" err="1">
+                <a:solidFill>
+                  <a:schemeClr val="lt1"/>
+                </a:solidFill>
+                <a:latin typeface="Proxima Nova"/>
+                <a:ea typeface="Proxima Nova"/>
+                <a:cs typeface="Proxima Nova"/>
+                <a:sym typeface="Proxima Nova"/>
+              </a:rPr>
+              <a:t>cf</a:t>
+            </a:r>
+            <a:r>
+              <a:rPr lang="en-US" sz="3200" b="1" dirty="0">
+                <a:solidFill>
+                  <a:schemeClr val="lt1"/>
+                </a:solidFill>
+                <a:latin typeface="Proxima Nova"/>
+                <a:ea typeface="Proxima Nova"/>
+                <a:cs typeface="Proxima Nova"/>
+                <a:sym typeface="Proxima Nova"/>
+              </a:rPr>
+              <a:t> </a:t>
+            </a:r>
+            <a:r>
+              <a:rPr lang="en-US" sz="3200" b="1" dirty="0" err="1">
+                <a:solidFill>
+                  <a:schemeClr val="lt1"/>
+                </a:solidFill>
+                <a:latin typeface="Proxima Nova"/>
+                <a:ea typeface="Proxima Nova"/>
+                <a:cs typeface="Proxima Nova"/>
+                <a:sym typeface="Proxima Nova"/>
+              </a:rPr>
+              <a:t>ssh</a:t>
+            </a:r>
+            <a:r>
+              <a:rPr lang="en-US" sz="3200" b="1" dirty="0">
+                <a:solidFill>
+                  <a:schemeClr val="lt1"/>
+                </a:solidFill>
+                <a:latin typeface="Proxima Nova"/>
+                <a:ea typeface="Proxima Nova"/>
+                <a:cs typeface="Proxima Nova"/>
+                <a:sym typeface="Proxima Nova"/>
+              </a:rPr>
+              <a:t> into the application</a:t>
+            </a:r>
+          </a:p>
+        </p:txBody>
+      </p:sp>
+      <p:sp>
+        <p:nvSpPr>
+          <p:cNvPr id="2" name="TextBox 1">
+            <a:extLst>
+              <a:ext uri="{FF2B5EF4-FFF2-40B4-BE49-F238E27FC236}">
+                <a16:creationId xmlns:a16="http://schemas.microsoft.com/office/drawing/2014/main" id="{346E1612-E7E6-44B3-82FC-753C683CF634}"/>
+              </a:ext>
+            </a:extLst>
+          </p:cNvPr>
+          <p:cNvSpPr txBox="1"/>
+          <p:nvPr/>
+        </p:nvSpPr>
+        <p:spPr>
+          <a:xfrm>
+            <a:off x="1073019" y="1377253"/>
+            <a:ext cx="6997960" cy="3046988"/>
+          </a:xfrm>
+          <a:prstGeom prst="rect">
+            <a:avLst/>
+          </a:prstGeom>
+          <a:noFill/>
+        </p:spPr>
+        <p:txBody>
+          <a:bodyPr wrap="square" rtlCol="0">
+            <a:spAutoFit/>
+          </a:bodyPr>
+          <a:lstStyle/>
+          <a:p>
+            <a:pPr marL="457200" indent="-457200">
+              <a:buFont typeface="Arial" panose="020B0604020202020204" pitchFamily="34" charset="0"/>
+              <a:buChar char="•"/>
+            </a:pPr>
+            <a:r>
+              <a:rPr lang="en-US" sz="2400" dirty="0">
+                <a:solidFill>
+                  <a:schemeClr val="bg1"/>
+                </a:solidFill>
+                <a:latin typeface="Proxima Nova" charset="0"/>
+                <a:ea typeface="Proxima Nova" charset="0"/>
+                <a:cs typeface="Proxima Nova" charset="0"/>
+              </a:rPr>
+              <a:t>“</a:t>
+            </a:r>
+            <a:r>
+              <a:rPr lang="en-US" sz="2400" dirty="0" err="1">
+                <a:solidFill>
+                  <a:schemeClr val="bg1"/>
+                </a:solidFill>
+                <a:latin typeface="Proxima Nova" charset="0"/>
+                <a:ea typeface="Proxima Nova" charset="0"/>
+                <a:cs typeface="Proxima Nova" charset="0"/>
+              </a:rPr>
+              <a:t>cf</a:t>
+            </a:r>
+            <a:r>
+              <a:rPr lang="en-US" sz="2400" dirty="0">
+                <a:solidFill>
+                  <a:schemeClr val="bg1"/>
+                </a:solidFill>
+                <a:latin typeface="Proxima Nova" charset="0"/>
+                <a:ea typeface="Proxima Nova" charset="0"/>
+                <a:cs typeface="Proxima Nova" charset="0"/>
+              </a:rPr>
+              <a:t> </a:t>
+            </a:r>
+            <a:r>
+              <a:rPr lang="en-US" sz="2400" dirty="0" err="1">
+                <a:solidFill>
+                  <a:schemeClr val="bg1"/>
+                </a:solidFill>
+                <a:latin typeface="Proxima Nova" charset="0"/>
+                <a:ea typeface="Proxima Nova" charset="0"/>
+                <a:cs typeface="Proxima Nova" charset="0"/>
+              </a:rPr>
+              <a:t>ssh</a:t>
+            </a:r>
+            <a:r>
+              <a:rPr lang="en-US" sz="2400" dirty="0">
+                <a:solidFill>
+                  <a:schemeClr val="bg1"/>
+                </a:solidFill>
+                <a:latin typeface="Proxima Nova" charset="0"/>
+                <a:ea typeface="Proxima Nova" charset="0"/>
+                <a:cs typeface="Proxima Nova" charset="0"/>
+              </a:rPr>
+              <a:t>” is now available on PAS Windows which enables developers more flexibility in testing and debugging their .NET Framework applications</a:t>
+            </a:r>
+          </a:p>
+          <a:p>
+            <a:pPr marL="457200" indent="-457200">
+              <a:buFont typeface="Arial" panose="020B0604020202020204" pitchFamily="34" charset="0"/>
+              <a:buChar char="•"/>
+            </a:pPr>
+            <a:r>
+              <a:rPr lang="en-US" sz="2400" dirty="0">
+                <a:solidFill>
+                  <a:schemeClr val="bg1"/>
+                </a:solidFill>
+                <a:latin typeface="Proxima Nova" charset="0"/>
+                <a:ea typeface="Proxima Nova" charset="0"/>
+                <a:cs typeface="Proxima Nova" charset="0"/>
+              </a:rPr>
+              <a:t>Open a command window and “</a:t>
+            </a:r>
+            <a:r>
+              <a:rPr lang="en-US" sz="2400" dirty="0" err="1">
+                <a:solidFill>
+                  <a:schemeClr val="bg1"/>
+                </a:solidFill>
+                <a:latin typeface="Proxima Nova" charset="0"/>
+                <a:ea typeface="Proxima Nova" charset="0"/>
+                <a:cs typeface="Proxima Nova" charset="0"/>
+              </a:rPr>
+              <a:t>cf</a:t>
+            </a:r>
+            <a:r>
+              <a:rPr lang="en-US" sz="2400" dirty="0">
+                <a:solidFill>
+                  <a:schemeClr val="bg1"/>
+                </a:solidFill>
+                <a:latin typeface="Proxima Nova" charset="0"/>
+                <a:ea typeface="Proxima Nova" charset="0"/>
+                <a:cs typeface="Proxima Nova" charset="0"/>
+              </a:rPr>
+              <a:t> </a:t>
+            </a:r>
+            <a:r>
+              <a:rPr lang="en-US" sz="2400" dirty="0" err="1">
+                <a:solidFill>
+                  <a:schemeClr val="bg1"/>
+                </a:solidFill>
+                <a:latin typeface="Proxima Nova" charset="0"/>
+                <a:ea typeface="Proxima Nova" charset="0"/>
+                <a:cs typeface="Proxima Nova" charset="0"/>
+              </a:rPr>
+              <a:t>ssh</a:t>
+            </a:r>
+            <a:r>
+              <a:rPr lang="en-US" sz="2400" dirty="0">
+                <a:solidFill>
+                  <a:schemeClr val="bg1"/>
+                </a:solidFill>
+                <a:latin typeface="Proxima Nova" charset="0"/>
+                <a:ea typeface="Proxima Nova" charset="0"/>
+                <a:cs typeface="Proxima Nova" charset="0"/>
+              </a:rPr>
+              <a:t>” into the application to show the file structure and how it mimics a physical or virtual server which helps ensure workload compatibility</a:t>
+            </a:r>
+          </a:p>
+        </p:txBody>
+      </p:sp>
+    </p:spTree>
+    <p:extLst>
+      <p:ext uri="{BB962C8B-B14F-4D97-AF65-F5344CB8AC3E}">
+        <p14:creationId xmlns:p14="http://schemas.microsoft.com/office/powerpoint/2010/main" val="1284394210"/>
+      </p:ext>
+    </p:extLst>
+  </p:cSld>
+  <p:clrMapOvr>
+    <a:masterClrMapping/>
+  </p:clrMapOvr>
+</p:sld>
+</file>
+
+<file path=ppt/slides/slide21.xml><?xml version="1.0" encoding="utf-8"?>
 <p:sld xmlns:a="http://schemas.openxmlformats.org/drawingml/2006/main" xmlns:r="http://schemas.openxmlformats.org/officeDocument/2006/relationships" xmlns:p="http://schemas.openxmlformats.org/presentationml/2006/main">
   <p:cSld>
     <p:spTree>
@@ -6483,7 +6865,7 @@
                 <a:cs typeface="Proxima Nova"/>
                 <a:sym typeface="Proxima Nova"/>
               </a:rPr>
-              <a:t>.NET 4.x support (web apps, web services, console apps) on Windows</a:t>
+              <a:t>.NET 4.x support (web apps, web services, console apps) on Windows – a platform for companies to “Move and Improve” their critical .NET workloads</a:t>
             </a:r>
           </a:p>
           <a:p>
@@ -7189,7 +7571,7 @@
               <a:buChar char="•"/>
             </a:pPr>
             <a:r>
-              <a:rPr lang="en-US" sz="1600" dirty="0">
+              <a:rPr lang="en-US" dirty="0">
                 <a:solidFill>
                   <a:schemeClr val="lt1"/>
                 </a:solidFill>
@@ -7217,7 +7599,7 @@
               <a:buChar char="•"/>
             </a:pPr>
             <a:r>
-              <a:rPr lang="en-US" sz="1600" dirty="0">
+              <a:rPr lang="en-US" dirty="0">
                 <a:solidFill>
                   <a:schemeClr val="lt1"/>
                 </a:solidFill>
@@ -7245,7 +7627,7 @@
               <a:buChar char="•"/>
             </a:pPr>
             <a:r>
-              <a:rPr lang="en-US" sz="1600" dirty="0">
+              <a:rPr lang="en-US" dirty="0">
                 <a:solidFill>
                   <a:schemeClr val="lt1"/>
                 </a:solidFill>
@@ -7273,7 +7655,7 @@
               <a:buChar char="•"/>
             </a:pPr>
             <a:r>
-              <a:rPr lang="en-US" sz="1600" dirty="0">
+              <a:rPr lang="en-US" dirty="0">
                 <a:solidFill>
                   <a:schemeClr val="lt1"/>
                 </a:solidFill>
@@ -7301,7 +7683,7 @@
               <a:buChar char="•"/>
             </a:pPr>
             <a:r>
-              <a:rPr lang="en-US" sz="1600" dirty="0">
+              <a:rPr lang="en-US" dirty="0">
                 <a:solidFill>
                   <a:schemeClr val="lt1"/>
                 </a:solidFill>
@@ -7329,7 +7711,7 @@
               <a:buChar char="•"/>
             </a:pPr>
             <a:r>
-              <a:rPr lang="en-US" sz="1600" dirty="0">
+              <a:rPr lang="en-US" dirty="0">
                 <a:solidFill>
                   <a:schemeClr val="lt1"/>
                 </a:solidFill>
@@ -7357,7 +7739,7 @@
               <a:buChar char="•"/>
             </a:pPr>
             <a:r>
-              <a:rPr lang="en-US" sz="1600" dirty="0">
+              <a:rPr lang="en-US" dirty="0">
                 <a:solidFill>
                   <a:schemeClr val="lt1"/>
                 </a:solidFill>
@@ -7385,7 +7767,7 @@
               <a:buChar char="•"/>
             </a:pPr>
             <a:r>
-              <a:rPr lang="en-US" sz="1600" dirty="0">
+              <a:rPr lang="en-US" dirty="0">
                 <a:solidFill>
                   <a:schemeClr val="lt1"/>
                 </a:solidFill>
@@ -7413,7 +7795,7 @@
               <a:buChar char="•"/>
             </a:pPr>
             <a:r>
-              <a:rPr lang="en-US" sz="1600" dirty="0">
+              <a:rPr lang="en-US" dirty="0">
                 <a:solidFill>
                   <a:schemeClr val="lt1"/>
                 </a:solidFill>
@@ -7423,6 +7805,82 @@
                 <a:sym typeface="Proxima Nova"/>
               </a:rPr>
               <a:t>Scale the application (number of instances, memory, and disk)</a:t>
+            </a:r>
+          </a:p>
+          <a:p>
+            <a:pPr marL="285750" marR="0" lvl="0" indent="-285750" algn="l" rtl="0">
+              <a:spcBef>
+                <a:spcPts val="1200"/>
+              </a:spcBef>
+              <a:spcAft>
+                <a:spcPts val="0"/>
+              </a:spcAft>
+              <a:buClr>
+                <a:schemeClr val="lt1"/>
+              </a:buClr>
+              <a:buSzPct val="100000"/>
+              <a:buFont typeface="Arial"/>
+              <a:buChar char="•"/>
+            </a:pPr>
+            <a:r>
+              <a:rPr lang="en-US" dirty="0">
+                <a:solidFill>
+                  <a:schemeClr val="lt1"/>
+                </a:solidFill>
+                <a:latin typeface="Proxima Nova"/>
+                <a:ea typeface="Proxima Nova"/>
+                <a:cs typeface="Proxima Nova"/>
+                <a:sym typeface="Proxima Nova"/>
+              </a:rPr>
+              <a:t>Show off </a:t>
+            </a:r>
+            <a:r>
+              <a:rPr lang="en-US" dirty="0" err="1">
+                <a:solidFill>
+                  <a:schemeClr val="lt1"/>
+                </a:solidFill>
+                <a:latin typeface="Proxima Nova"/>
+                <a:ea typeface="Proxima Nova"/>
+                <a:cs typeface="Proxima Nova"/>
+                <a:sym typeface="Proxima Nova"/>
+              </a:rPr>
+              <a:t>cf</a:t>
+            </a:r>
+            <a:r>
+              <a:rPr lang="en-US" dirty="0">
+                <a:solidFill>
+                  <a:schemeClr val="lt1"/>
+                </a:solidFill>
+                <a:latin typeface="Proxima Nova"/>
+                <a:ea typeface="Proxima Nova"/>
+                <a:cs typeface="Proxima Nova"/>
+                <a:sym typeface="Proxima Nova"/>
+              </a:rPr>
+              <a:t> </a:t>
+            </a:r>
+            <a:r>
+              <a:rPr lang="en-US" dirty="0" err="1">
+                <a:solidFill>
+                  <a:schemeClr val="lt1"/>
+                </a:solidFill>
+                <a:latin typeface="Proxima Nova"/>
+                <a:ea typeface="Proxima Nova"/>
+                <a:cs typeface="Proxima Nova"/>
+                <a:sym typeface="Proxima Nova"/>
+              </a:rPr>
+              <a:t>ssh</a:t>
+            </a:r>
+            <a:r>
+              <a:rPr lang="en-US" dirty="0">
+                <a:solidFill>
+                  <a:schemeClr val="lt1"/>
+                </a:solidFill>
+                <a:latin typeface="Proxima Nova"/>
+                <a:ea typeface="Proxima Nova"/>
+                <a:cs typeface="Proxima Nova"/>
+                <a:sym typeface="Proxima Nova"/>
+              </a:rPr>
+              <a:t> capabilities </a:t>
             </a:r>
           </a:p>
           <a:p>
@@ -7439,7 +7897,7 @@
               <a:buFont typeface="Arial"/>
               <a:buNone/>
             </a:pPr>
-            <a:endParaRPr sz="1600" dirty="0">
+            <a:endParaRPr dirty="0">
               <a:solidFill>
                 <a:schemeClr val="lt1"/>
               </a:solidFill>
@@ -7890,6 +8348,55 @@
                                           <p:spTgt spid="381">
                                             <p:txEl>
                                               <p:pRg st="8" end="8"/>
+                                            </p:txEl>
+                                          </p:spTgt>
+                                        </p:tgtEl>
+                                        <p:attrNameLst>
+                                          <p:attrName>style.visibility</p:attrName>
+                                        </p:attrNameLst>
+                                      </p:cBhvr>
+                                      <p:to>
+                                        <p:strVal val="visible"/>
+                                      </p:to>
+                                    </p:set>
+                                  </p:childTnLst>
+                                </p:cTn>
+                              </p:par>
+                            </p:childTnLst>
+                          </p:cTn>
+                        </p:par>
+                      </p:childTnLst>
+                    </p:cTn>
+                  </p:par>
+                  <p:par>
+                    <p:cTn id="39" fill="hold">
+                      <p:stCondLst>
+                        <p:cond delay="indefinite"/>
+                      </p:stCondLst>
+                      <p:childTnLst>
+                        <p:par>
+                          <p:cTn id="40" fill="hold">
+                            <p:stCondLst>
+                              <p:cond delay="0"/>
+                            </p:stCondLst>
+                            <p:childTnLst>
+                              <p:par>
+                                <p:cTn id="41" presetID="1" presetClass="entr" presetSubtype="0" fill="hold" grpId="0" nodeType="clickEffect">
+                                  <p:stCondLst>
+                                    <p:cond delay="0"/>
+                                  </p:stCondLst>
+                                  <p:childTnLst>
+                                    <p:set>
+                                      <p:cBhvr>
+                                        <p:cTn id="42" dur="1" fill="hold">
+                                          <p:stCondLst>
+                                            <p:cond delay="0"/>
+                                          </p:stCondLst>
+                                        </p:cTn>
+                                        <p:tgtEl>
+                                          <p:spTgt spid="381">
+                                            <p:txEl>
+                                              <p:pRg st="9" end="9"/>
                                             </p:txEl>
                                           </p:spTgt>
                                         </p:tgtEl>

</xml_diff>